<commit_message>
[presentation] fixed one small big mistake in intermediate presentation
</commit_message>
<xml_diff>
--- a/presentations/intermediate/intermediate3/Presentation_Buehler_Steuerlein.pptx
+++ b/presentations/intermediate/intermediate3/Presentation_Buehler_Steuerlein.pptx
@@ -5420,8 +5420,12 @@
               <a:t>touch</a:t>
             </a:r>
             <a:r>
+              <a:rPr lang="de-DE"/>
+              <a:t>: 5.389 </a:t>
+            </a:r>
+            <a:r>
               <a:rPr lang="de-DE" dirty="0"/>
-              <a:t>: 63.51 mm </a:t>
+              <a:t>mm </a:t>
             </a:r>
           </a:p>
           <a:p>

</xml_diff>